<commit_message>
added analyses notebook and tidied up the folders
</commit_message>
<xml_diff>
--- a/Report/Report.pptx
+++ b/Report/Report.pptx
@@ -9,10 +9,13 @@
     <p:sldId id="257" r:id="rId3"/>
     <p:sldId id="258" r:id="rId4"/>
     <p:sldId id="259" r:id="rId5"/>
-    <p:sldId id="260" r:id="rId6"/>
-    <p:sldId id="261" r:id="rId7"/>
-    <p:sldId id="262" r:id="rId8"/>
-    <p:sldId id="263" r:id="rId9"/>
+    <p:sldId id="262" r:id="rId6"/>
+    <p:sldId id="264" r:id="rId7"/>
+    <p:sldId id="265" r:id="rId8"/>
+    <p:sldId id="266" r:id="rId9"/>
+    <p:sldId id="267" r:id="rId10"/>
+    <p:sldId id="261" r:id="rId11"/>
+    <p:sldId id="263" r:id="rId12"/>
   </p:sldIdLst>
   <p:sldSz cx="12192000" cy="6858000"/>
   <p:notesSz cx="6858000" cy="9144000"/>
@@ -111,6 +114,11 @@
       </a:defRPr>
     </a:lvl9pPr>
   </p:defaultTextStyle>
+  <p:extLst>
+    <p:ext uri="{EFAFB233-063F-42B5-8137-9DF3F51BA10A}">
+      <p15:sldGuideLst xmlns:p15="http://schemas.microsoft.com/office/powerpoint/2012/main"/>
+    </p:ext>
+  </p:extLst>
 </p:presentation>
 </file>
 
@@ -263,7 +271,7 @@
           <a:p>
             <a:fld id="{C4FB3C3D-598A-4EBD-BFB2-FA1C2477E0F9}" type="datetimeFigureOut">
               <a:rPr lang="en-GB" smtClean="0"/>
-              <a:t>29/11/2023</a:t>
+              <a:t>30/11/2023</a:t>
             </a:fld>
             <a:endParaRPr lang="en-GB"/>
           </a:p>
@@ -463,7 +471,7 @@
           <a:p>
             <a:fld id="{C4FB3C3D-598A-4EBD-BFB2-FA1C2477E0F9}" type="datetimeFigureOut">
               <a:rPr lang="en-GB" smtClean="0"/>
-              <a:t>29/11/2023</a:t>
+              <a:t>30/11/2023</a:t>
             </a:fld>
             <a:endParaRPr lang="en-GB"/>
           </a:p>
@@ -673,7 +681,7 @@
           <a:p>
             <a:fld id="{C4FB3C3D-598A-4EBD-BFB2-FA1C2477E0F9}" type="datetimeFigureOut">
               <a:rPr lang="en-GB" smtClean="0"/>
-              <a:t>29/11/2023</a:t>
+              <a:t>30/11/2023</a:t>
             </a:fld>
             <a:endParaRPr lang="en-GB"/>
           </a:p>
@@ -873,7 +881,7 @@
           <a:p>
             <a:fld id="{C4FB3C3D-598A-4EBD-BFB2-FA1C2477E0F9}" type="datetimeFigureOut">
               <a:rPr lang="en-GB" smtClean="0"/>
-              <a:t>29/11/2023</a:t>
+              <a:t>30/11/2023</a:t>
             </a:fld>
             <a:endParaRPr lang="en-GB"/>
           </a:p>
@@ -1149,7 +1157,7 @@
           <a:p>
             <a:fld id="{C4FB3C3D-598A-4EBD-BFB2-FA1C2477E0F9}" type="datetimeFigureOut">
               <a:rPr lang="en-GB" smtClean="0"/>
-              <a:t>29/11/2023</a:t>
+              <a:t>30/11/2023</a:t>
             </a:fld>
             <a:endParaRPr lang="en-GB"/>
           </a:p>
@@ -1417,7 +1425,7 @@
           <a:p>
             <a:fld id="{C4FB3C3D-598A-4EBD-BFB2-FA1C2477E0F9}" type="datetimeFigureOut">
               <a:rPr lang="en-GB" smtClean="0"/>
-              <a:t>29/11/2023</a:t>
+              <a:t>30/11/2023</a:t>
             </a:fld>
             <a:endParaRPr lang="en-GB"/>
           </a:p>
@@ -1832,7 +1840,7 @@
           <a:p>
             <a:fld id="{C4FB3C3D-598A-4EBD-BFB2-FA1C2477E0F9}" type="datetimeFigureOut">
               <a:rPr lang="en-GB" smtClean="0"/>
-              <a:t>29/11/2023</a:t>
+              <a:t>30/11/2023</a:t>
             </a:fld>
             <a:endParaRPr lang="en-GB"/>
           </a:p>
@@ -1974,7 +1982,7 @@
           <a:p>
             <a:fld id="{C4FB3C3D-598A-4EBD-BFB2-FA1C2477E0F9}" type="datetimeFigureOut">
               <a:rPr lang="en-GB" smtClean="0"/>
-              <a:t>29/11/2023</a:t>
+              <a:t>30/11/2023</a:t>
             </a:fld>
             <a:endParaRPr lang="en-GB"/>
           </a:p>
@@ -2087,7 +2095,7 @@
           <a:p>
             <a:fld id="{C4FB3C3D-598A-4EBD-BFB2-FA1C2477E0F9}" type="datetimeFigureOut">
               <a:rPr lang="en-GB" smtClean="0"/>
-              <a:t>29/11/2023</a:t>
+              <a:t>30/11/2023</a:t>
             </a:fld>
             <a:endParaRPr lang="en-GB"/>
           </a:p>
@@ -2400,7 +2408,7 @@
           <a:p>
             <a:fld id="{C4FB3C3D-598A-4EBD-BFB2-FA1C2477E0F9}" type="datetimeFigureOut">
               <a:rPr lang="en-GB" smtClean="0"/>
-              <a:t>29/11/2023</a:t>
+              <a:t>30/11/2023</a:t>
             </a:fld>
             <a:endParaRPr lang="en-GB"/>
           </a:p>
@@ -2689,7 +2697,7 @@
           <a:p>
             <a:fld id="{C4FB3C3D-598A-4EBD-BFB2-FA1C2477E0F9}" type="datetimeFigureOut">
               <a:rPr lang="en-GB" smtClean="0"/>
-              <a:t>29/11/2023</a:t>
+              <a:t>30/11/2023</a:t>
             </a:fld>
             <a:endParaRPr lang="en-GB"/>
           </a:p>
@@ -2932,7 +2940,7 @@
           <a:p>
             <a:fld id="{C4FB3C3D-598A-4EBD-BFB2-FA1C2477E0F9}" type="datetimeFigureOut">
               <a:rPr lang="en-GB" smtClean="0"/>
-              <a:t>29/11/2023</a:t>
+              <a:t>30/11/2023</a:t>
             </a:fld>
             <a:endParaRPr lang="en-GB"/>
           </a:p>
@@ -3437,6 +3445,326 @@
 </p:sld>
 </file>
 
+<file path=ppt/slides/slide10.xml><?xml version="1.0" encoding="utf-8"?>
+<p:sld xmlns:a="http://schemas.openxmlformats.org/drawingml/2006/main" xmlns:r="http://schemas.openxmlformats.org/officeDocument/2006/relationships" xmlns:p="http://schemas.openxmlformats.org/presentationml/2006/main">
+  <p:cSld>
+    <p:spTree>
+      <p:nvGrpSpPr>
+        <p:cNvPr id="1" name=""/>
+        <p:cNvGrpSpPr/>
+        <p:nvPr/>
+      </p:nvGrpSpPr>
+      <p:grpSpPr>
+        <a:xfrm>
+          <a:off x="0" y="0"/>
+          <a:ext cx="0" cy="0"/>
+          <a:chOff x="0" y="0"/>
+          <a:chExt cx="0" cy="0"/>
+        </a:xfrm>
+      </p:grpSpPr>
+      <p:sp>
+        <p:nvSpPr>
+          <p:cNvPr id="2" name="Title 1">
+            <a:extLst>
+              <a:ext uri="{FF2B5EF4-FFF2-40B4-BE49-F238E27FC236}">
+                <a16:creationId xmlns:a16="http://schemas.microsoft.com/office/drawing/2014/main" id="{17A04E8B-410C-A2EB-7FBA-A148B77C43C1}"/>
+              </a:ext>
+            </a:extLst>
+          </p:cNvPr>
+          <p:cNvSpPr>
+            <a:spLocks noGrp="1"/>
+          </p:cNvSpPr>
+          <p:nvPr>
+            <p:ph type="title"/>
+          </p:nvPr>
+        </p:nvSpPr>
+        <p:spPr/>
+        <p:txBody>
+          <a:bodyPr/>
+          <a:lstStyle/>
+          <a:p>
+            <a:r>
+              <a:rPr lang="en-GB" dirty="0"/>
+              <a:t>Have Track Features Changed?</a:t>
+            </a:r>
+          </a:p>
+        </p:txBody>
+      </p:sp>
+      <p:pic>
+        <p:nvPicPr>
+          <p:cNvPr id="5" name="Content Placeholder 4" descr="A graph with a line&#10;&#10;Description automatically generated">
+            <a:extLst>
+              <a:ext uri="{FF2B5EF4-FFF2-40B4-BE49-F238E27FC236}">
+                <a16:creationId xmlns:a16="http://schemas.microsoft.com/office/drawing/2014/main" id="{2AE1661D-2DDA-2F14-8807-86CDD433DACD}"/>
+              </a:ext>
+            </a:extLst>
+          </p:cNvPr>
+          <p:cNvPicPr>
+            <a:picLocks noGrp="1" noChangeAspect="1"/>
+          </p:cNvPicPr>
+          <p:nvPr>
+            <p:ph idx="1"/>
+          </p:nvPr>
+        </p:nvPicPr>
+        <p:blipFill>
+          <a:blip r:embed="rId2">
+            <a:extLst>
+              <a:ext uri="{28A0092B-C50C-407E-A947-70E740481C1C}">
+                <a14:useLocalDpi xmlns:a14="http://schemas.microsoft.com/office/drawing/2010/main" val="0"/>
+              </a:ext>
+            </a:extLst>
+          </a:blip>
+          <a:stretch>
+            <a:fillRect/>
+          </a:stretch>
+        </p:blipFill>
+        <p:spPr>
+          <a:xfrm>
+            <a:off x="6139372" y="4415630"/>
+            <a:ext cx="2075288" cy="1556466"/>
+          </a:xfrm>
+        </p:spPr>
+      </p:pic>
+      <p:pic>
+        <p:nvPicPr>
+          <p:cNvPr id="7" name="Picture 6" descr="A graph with a line&#10;&#10;Description automatically generated">
+            <a:extLst>
+              <a:ext uri="{FF2B5EF4-FFF2-40B4-BE49-F238E27FC236}">
+                <a16:creationId xmlns:a16="http://schemas.microsoft.com/office/drawing/2014/main" id="{75B649C8-586B-ED7D-2EBE-C947503958FA}"/>
+              </a:ext>
+            </a:extLst>
+          </p:cNvPr>
+          <p:cNvPicPr>
+            <a:picLocks noChangeAspect="1"/>
+          </p:cNvPicPr>
+          <p:nvPr/>
+        </p:nvPicPr>
+        <p:blipFill>
+          <a:blip r:embed="rId3">
+            <a:extLst>
+              <a:ext uri="{28A0092B-C50C-407E-A947-70E740481C1C}">
+                <a14:useLocalDpi xmlns:a14="http://schemas.microsoft.com/office/drawing/2010/main" val="0"/>
+              </a:ext>
+            </a:extLst>
+          </a:blip>
+          <a:stretch>
+            <a:fillRect/>
+          </a:stretch>
+        </p:blipFill>
+        <p:spPr>
+          <a:xfrm>
+            <a:off x="5802945" y="1664137"/>
+            <a:ext cx="2981398" cy="2236049"/>
+          </a:xfrm>
+          <a:prstGeom prst="rect">
+            <a:avLst/>
+          </a:prstGeom>
+        </p:spPr>
+      </p:pic>
+      <p:pic>
+        <p:nvPicPr>
+          <p:cNvPr id="9" name="Picture 8" descr="A graph with blue lines&#10;&#10;Description automatically generated">
+            <a:extLst>
+              <a:ext uri="{FF2B5EF4-FFF2-40B4-BE49-F238E27FC236}">
+                <a16:creationId xmlns:a16="http://schemas.microsoft.com/office/drawing/2014/main" id="{AD8D00BF-315B-0F60-2614-24C32AAC484A}"/>
+              </a:ext>
+            </a:extLst>
+          </p:cNvPr>
+          <p:cNvPicPr>
+            <a:picLocks noChangeAspect="1"/>
+          </p:cNvPicPr>
+          <p:nvPr/>
+        </p:nvPicPr>
+        <p:blipFill>
+          <a:blip r:embed="rId4">
+            <a:extLst>
+              <a:ext uri="{28A0092B-C50C-407E-A947-70E740481C1C}">
+                <a14:useLocalDpi xmlns:a14="http://schemas.microsoft.com/office/drawing/2010/main" val="0"/>
+              </a:ext>
+            </a:extLst>
+          </a:blip>
+          <a:stretch>
+            <a:fillRect/>
+          </a:stretch>
+        </p:blipFill>
+        <p:spPr>
+          <a:xfrm>
+            <a:off x="9274255" y="4857750"/>
+            <a:ext cx="2448623" cy="1836467"/>
+          </a:xfrm>
+          <a:prstGeom prst="rect">
+            <a:avLst/>
+          </a:prstGeom>
+        </p:spPr>
+      </p:pic>
+      <p:pic>
+        <p:nvPicPr>
+          <p:cNvPr id="11" name="Picture 10" descr="A graph with a line&#10;&#10;Description automatically generated">
+            <a:extLst>
+              <a:ext uri="{FF2B5EF4-FFF2-40B4-BE49-F238E27FC236}">
+                <a16:creationId xmlns:a16="http://schemas.microsoft.com/office/drawing/2014/main" id="{51094F9E-65A4-91EB-2D23-072E0924A4E8}"/>
+              </a:ext>
+            </a:extLst>
+          </p:cNvPr>
+          <p:cNvPicPr>
+            <a:picLocks noChangeAspect="1"/>
+          </p:cNvPicPr>
+          <p:nvPr/>
+        </p:nvPicPr>
+        <p:blipFill>
+          <a:blip r:embed="rId5">
+            <a:extLst>
+              <a:ext uri="{28A0092B-C50C-407E-A947-70E740481C1C}">
+                <a14:useLocalDpi xmlns:a14="http://schemas.microsoft.com/office/drawing/2010/main" val="0"/>
+              </a:ext>
+            </a:extLst>
+          </a:blip>
+          <a:stretch>
+            <a:fillRect/>
+          </a:stretch>
+        </p:blipFill>
+        <p:spPr>
+          <a:xfrm>
+            <a:off x="8727299" y="2811703"/>
+            <a:ext cx="2902623" cy="2176967"/>
+          </a:xfrm>
+          <a:prstGeom prst="rect">
+            <a:avLst/>
+          </a:prstGeom>
+        </p:spPr>
+      </p:pic>
+      <p:pic>
+        <p:nvPicPr>
+          <p:cNvPr id="13" name="Picture 12" descr="A graph with a line&#10;&#10;Description automatically generated">
+            <a:extLst>
+              <a:ext uri="{FF2B5EF4-FFF2-40B4-BE49-F238E27FC236}">
+                <a16:creationId xmlns:a16="http://schemas.microsoft.com/office/drawing/2014/main" id="{D14A4D72-34D2-B38A-377B-C602A6F3F46B}"/>
+              </a:ext>
+            </a:extLst>
+          </p:cNvPr>
+          <p:cNvPicPr>
+            <a:picLocks noChangeAspect="1"/>
+          </p:cNvPicPr>
+          <p:nvPr/>
+        </p:nvPicPr>
+        <p:blipFill>
+          <a:blip r:embed="rId6">
+            <a:extLst>
+              <a:ext uri="{28A0092B-C50C-407E-A947-70E740481C1C}">
+                <a14:useLocalDpi xmlns:a14="http://schemas.microsoft.com/office/drawing/2010/main" val="0"/>
+              </a:ext>
+            </a:extLst>
+          </a:blip>
+          <a:stretch>
+            <a:fillRect/>
+          </a:stretch>
+        </p:blipFill>
+        <p:spPr>
+          <a:xfrm>
+            <a:off x="8877299" y="552053"/>
+            <a:ext cx="3012867" cy="2259650"/>
+          </a:xfrm>
+          <a:prstGeom prst="rect">
+            <a:avLst/>
+          </a:prstGeom>
+        </p:spPr>
+      </p:pic>
+    </p:spTree>
+    <p:extLst>
+      <p:ext uri="{BB962C8B-B14F-4D97-AF65-F5344CB8AC3E}">
+        <p14:creationId xmlns:p14="http://schemas.microsoft.com/office/powerpoint/2010/main" val="3951536143"/>
+      </p:ext>
+    </p:extLst>
+  </p:cSld>
+  <p:clrMapOvr>
+    <a:masterClrMapping/>
+  </p:clrMapOvr>
+</p:sld>
+</file>
+
+<file path=ppt/slides/slide11.xml><?xml version="1.0" encoding="utf-8"?>
+<p:sld xmlns:a="http://schemas.openxmlformats.org/drawingml/2006/main" xmlns:r="http://schemas.openxmlformats.org/officeDocument/2006/relationships" xmlns:p="http://schemas.openxmlformats.org/presentationml/2006/main">
+  <p:cSld>
+    <p:spTree>
+      <p:nvGrpSpPr>
+        <p:cNvPr id="1" name=""/>
+        <p:cNvGrpSpPr/>
+        <p:nvPr/>
+      </p:nvGrpSpPr>
+      <p:grpSpPr>
+        <a:xfrm>
+          <a:off x="0" y="0"/>
+          <a:ext cx="0" cy="0"/>
+          <a:chOff x="0" y="0"/>
+          <a:chExt cx="0" cy="0"/>
+        </a:xfrm>
+      </p:grpSpPr>
+      <p:sp>
+        <p:nvSpPr>
+          <p:cNvPr id="2" name="Title 1">
+            <a:extLst>
+              <a:ext uri="{FF2B5EF4-FFF2-40B4-BE49-F238E27FC236}">
+                <a16:creationId xmlns:a16="http://schemas.microsoft.com/office/drawing/2014/main" id="{B4FB5A95-3AF6-65D8-08CD-8D585C5E2DB8}"/>
+              </a:ext>
+            </a:extLst>
+          </p:cNvPr>
+          <p:cNvSpPr>
+            <a:spLocks noGrp="1"/>
+          </p:cNvSpPr>
+          <p:nvPr>
+            <p:ph type="title"/>
+          </p:nvPr>
+        </p:nvSpPr>
+        <p:spPr/>
+        <p:txBody>
+          <a:bodyPr/>
+          <a:lstStyle/>
+          <a:p>
+            <a:r>
+              <a:rPr lang="en-GB" dirty="0"/>
+              <a:t>Conclusions</a:t>
+            </a:r>
+          </a:p>
+        </p:txBody>
+      </p:sp>
+      <p:sp>
+        <p:nvSpPr>
+          <p:cNvPr id="3" name="Content Placeholder 2">
+            <a:extLst>
+              <a:ext uri="{FF2B5EF4-FFF2-40B4-BE49-F238E27FC236}">
+                <a16:creationId xmlns:a16="http://schemas.microsoft.com/office/drawing/2014/main" id="{D6A2EAFD-CEA7-3D77-824C-7210674B2B0A}"/>
+              </a:ext>
+            </a:extLst>
+          </p:cNvPr>
+          <p:cNvSpPr>
+            <a:spLocks noGrp="1"/>
+          </p:cNvSpPr>
+          <p:nvPr>
+            <p:ph idx="1"/>
+          </p:nvPr>
+        </p:nvSpPr>
+        <p:spPr/>
+        <p:txBody>
+          <a:bodyPr/>
+          <a:lstStyle/>
+          <a:p>
+            <a:endParaRPr lang="en-GB"/>
+          </a:p>
+        </p:txBody>
+      </p:sp>
+    </p:spTree>
+    <p:extLst>
+      <p:ext uri="{BB962C8B-B14F-4D97-AF65-F5344CB8AC3E}">
+        <p14:creationId xmlns:p14="http://schemas.microsoft.com/office/powerpoint/2010/main" val="3616880911"/>
+      </p:ext>
+    </p:extLst>
+  </p:cSld>
+  <p:clrMapOvr>
+    <a:masterClrMapping/>
+  </p:clrMapOvr>
+</p:sld>
+</file>
+
 <file path=ppt/slides/slide2.xml><?xml version="1.0" encoding="utf-8"?>
 <p:sld xmlns:a="http://schemas.openxmlformats.org/drawingml/2006/main" xmlns:r="http://schemas.openxmlformats.org/officeDocument/2006/relationships" xmlns:p="http://schemas.openxmlformats.org/presentationml/2006/main">
   <p:cSld>
@@ -3960,7 +4288,7 @@
           <p:cNvPr id="2" name="Title 1">
             <a:extLst>
               <a:ext uri="{FF2B5EF4-FFF2-40B4-BE49-F238E27FC236}">
-                <a16:creationId xmlns:a16="http://schemas.microsoft.com/office/drawing/2014/main" id="{3619DD84-A812-60A5-0F3E-B807D32AC08A}"/>
+                <a16:creationId xmlns:a16="http://schemas.microsoft.com/office/drawing/2014/main" id="{59017C7C-5DC7-A674-8610-2A2C05E4E66D}"/>
               </a:ext>
             </a:extLst>
           </p:cNvPr>
@@ -3978,122 +4306,40 @@
           <a:p>
             <a:r>
               <a:rPr lang="en-GB" dirty="0"/>
-              <a:t>Has Song Duration Decreased?</a:t>
-            </a:r>
-          </a:p>
-        </p:txBody>
-      </p:sp>
-      <p:pic>
-        <p:nvPicPr>
-          <p:cNvPr id="5" name="Content Placeholder 4" descr="A white background with black and white clouds&#10;&#10;Description automatically generated">
-            <a:extLst>
-              <a:ext uri="{FF2B5EF4-FFF2-40B4-BE49-F238E27FC236}">
-                <a16:creationId xmlns:a16="http://schemas.microsoft.com/office/drawing/2014/main" id="{CBFDC030-5AC3-652E-ADF8-BC1CD594DAF2}"/>
-              </a:ext>
-            </a:extLst>
-          </p:cNvPr>
-          <p:cNvPicPr>
-            <a:picLocks noGrp="1" noChangeAspect="1"/>
-          </p:cNvPicPr>
+              <a:t>Artists</a:t>
+            </a:r>
+          </a:p>
+        </p:txBody>
+      </p:sp>
+      <p:sp>
+        <p:nvSpPr>
+          <p:cNvPr id="3" name="Content Placeholder 2">
+            <a:extLst>
+              <a:ext uri="{FF2B5EF4-FFF2-40B4-BE49-F238E27FC236}">
+                <a16:creationId xmlns:a16="http://schemas.microsoft.com/office/drawing/2014/main" id="{F6EDA27F-C57D-C2FD-49DE-D73B22738517}"/>
+              </a:ext>
+            </a:extLst>
+          </p:cNvPr>
+          <p:cNvSpPr>
+            <a:spLocks noGrp="1"/>
+          </p:cNvSpPr>
           <p:nvPr>
             <p:ph idx="1"/>
           </p:nvPr>
-        </p:nvPicPr>
-        <p:blipFill>
-          <a:blip r:embed="rId2">
-            <a:extLst>
-              <a:ext uri="{28A0092B-C50C-407E-A947-70E740481C1C}">
-                <a14:useLocalDpi xmlns:a14="http://schemas.microsoft.com/office/drawing/2010/main" val="0"/>
-              </a:ext>
-            </a:extLst>
-          </a:blip>
-          <a:stretch>
-            <a:fillRect/>
-          </a:stretch>
-        </p:blipFill>
-        <p:spPr>
-          <a:xfrm>
-            <a:off x="3195108" y="1825625"/>
-            <a:ext cx="5801784" cy="4351338"/>
-          </a:xfrm>
-        </p:spPr>
-      </p:pic>
-      <p:pic>
-        <p:nvPicPr>
-          <p:cNvPr id="7" name="Picture 6" descr="A white background with black dots&#10;&#10;Description automatically generated">
-            <a:extLst>
-              <a:ext uri="{FF2B5EF4-FFF2-40B4-BE49-F238E27FC236}">
-                <a16:creationId xmlns:a16="http://schemas.microsoft.com/office/drawing/2014/main" id="{F65E69DB-C009-0865-FEE8-AA513D4145E9}"/>
-              </a:ext>
-            </a:extLst>
-          </p:cNvPr>
-          <p:cNvPicPr>
-            <a:picLocks noChangeAspect="1"/>
-          </p:cNvPicPr>
-          <p:nvPr/>
-        </p:nvPicPr>
-        <p:blipFill>
-          <a:blip r:embed="rId2">
-            <a:extLst>
-              <a:ext uri="{28A0092B-C50C-407E-A947-70E740481C1C}">
-                <a14:useLocalDpi xmlns:a14="http://schemas.microsoft.com/office/drawing/2010/main" val="0"/>
-              </a:ext>
-            </a:extLst>
-          </a:blip>
-          <a:stretch>
-            <a:fillRect/>
-          </a:stretch>
-        </p:blipFill>
-        <p:spPr>
-          <a:xfrm>
-            <a:off x="3319914" y="1384435"/>
-            <a:ext cx="5852172" cy="4389129"/>
-          </a:xfrm>
-          <a:prstGeom prst="rect">
-            <a:avLst/>
-          </a:prstGeom>
-        </p:spPr>
-      </p:pic>
-      <p:pic>
-        <p:nvPicPr>
-          <p:cNvPr id="9" name="Picture 8" descr="A graph with blue and orange lines&#10;&#10;Description automatically generated">
-            <a:extLst>
-              <a:ext uri="{FF2B5EF4-FFF2-40B4-BE49-F238E27FC236}">
-                <a16:creationId xmlns:a16="http://schemas.microsoft.com/office/drawing/2014/main" id="{71B378DE-4701-731F-26B7-9726106EDFEE}"/>
-              </a:ext>
-            </a:extLst>
-          </p:cNvPr>
-          <p:cNvPicPr>
-            <a:picLocks noChangeAspect="1"/>
-          </p:cNvPicPr>
-          <p:nvPr/>
-        </p:nvPicPr>
-        <p:blipFill>
-          <a:blip r:embed="rId3">
-            <a:extLst>
-              <a:ext uri="{28A0092B-C50C-407E-A947-70E740481C1C}">
-                <a14:useLocalDpi xmlns:a14="http://schemas.microsoft.com/office/drawing/2010/main" val="0"/>
-              </a:ext>
-            </a:extLst>
-          </a:blip>
-          <a:stretch>
-            <a:fillRect/>
-          </a:stretch>
-        </p:blipFill>
-        <p:spPr>
-          <a:xfrm>
-            <a:off x="9172086" y="4443412"/>
-            <a:ext cx="2805385" cy="2104039"/>
-          </a:xfrm>
-          <a:prstGeom prst="rect">
-            <a:avLst/>
-          </a:prstGeom>
-        </p:spPr>
-      </p:pic>
+        </p:nvSpPr>
+        <p:spPr/>
+        <p:txBody>
+          <a:bodyPr/>
+          <a:lstStyle/>
+          <a:p>
+            <a:endParaRPr lang="en-GB"/>
+          </a:p>
+        </p:txBody>
+      </p:sp>
     </p:spTree>
     <p:extLst>
       <p:ext uri="{BB962C8B-B14F-4D97-AF65-F5344CB8AC3E}">
-        <p14:creationId xmlns:p14="http://schemas.microsoft.com/office/powerpoint/2010/main" val="1595209896"/>
+        <p14:creationId xmlns:p14="http://schemas.microsoft.com/office/powerpoint/2010/main" val="277639627"/>
       </p:ext>
     </p:extLst>
   </p:cSld>
@@ -4125,7 +4371,7 @@
           <p:cNvPr id="2" name="Title 1">
             <a:extLst>
               <a:ext uri="{FF2B5EF4-FFF2-40B4-BE49-F238E27FC236}">
-                <a16:creationId xmlns:a16="http://schemas.microsoft.com/office/drawing/2014/main" id="{17A04E8B-410C-A2EB-7FBA-A148B77C43C1}"/>
+                <a16:creationId xmlns:a16="http://schemas.microsoft.com/office/drawing/2014/main" id="{D5FF9F3F-5118-7E44-65D8-2528515D65D9}"/>
               </a:ext>
             </a:extLst>
           </p:cNvPr>
@@ -4142,27 +4388,110 @@
           <a:lstStyle/>
           <a:p>
             <a:r>
-              <a:rPr lang="en-GB" dirty="0"/>
-              <a:t>Have Track Features Changed?</a:t>
+              <a:rPr lang="en-GB" b="1" dirty="0"/>
+              <a:t>Has Song Duration Decreased?</a:t>
+            </a:r>
+            <a:endParaRPr lang="en-US" b="1" dirty="0"/>
+          </a:p>
+        </p:txBody>
+      </p:sp>
+      <p:sp>
+        <p:nvSpPr>
+          <p:cNvPr id="3" name="Content Placeholder 2">
+            <a:extLst>
+              <a:ext uri="{FF2B5EF4-FFF2-40B4-BE49-F238E27FC236}">
+                <a16:creationId xmlns:a16="http://schemas.microsoft.com/office/drawing/2014/main" id="{3F3B67B3-3A8F-4211-7F1B-9D38B7403903}"/>
+              </a:ext>
+            </a:extLst>
+          </p:cNvPr>
+          <p:cNvSpPr>
+            <a:spLocks noGrp="1"/>
+          </p:cNvSpPr>
+          <p:nvPr>
+            <p:ph idx="1"/>
+          </p:nvPr>
+        </p:nvSpPr>
+        <p:spPr/>
+        <p:txBody>
+          <a:bodyPr/>
+          <a:lstStyle/>
+          <a:p>
+            <a:r>
+              <a:rPr lang="en-US" dirty="0"/>
+              <a:t>Short answer: YES!</a:t>
+            </a:r>
+          </a:p>
+          <a:p>
+            <a:pPr marL="0" indent="0">
+              <a:buNone/>
+            </a:pPr>
+            <a:endParaRPr lang="en-US" dirty="0"/>
+          </a:p>
+          <a:p>
+            <a:pPr marL="0" indent="0">
+              <a:buNone/>
+            </a:pPr>
+            <a:endParaRPr lang="en-US" dirty="0"/>
+          </a:p>
+          <a:p>
+            <a:pPr marL="0" indent="0">
+              <a:buNone/>
+            </a:pPr>
+            <a:endParaRPr lang="en-US" dirty="0"/>
+          </a:p>
+          <a:p>
+            <a:pPr marL="0" indent="0">
+              <a:buNone/>
+            </a:pPr>
+            <a:r>
+              <a:rPr lang="en-US" dirty="0"/>
+              <a:t>How?</a:t>
+            </a:r>
+          </a:p>
+          <a:p>
+            <a:r>
+              <a:rPr lang="en-US" dirty="0"/>
+              <a:t>Line plot &amp; Boxplot</a:t>
+            </a:r>
+          </a:p>
+          <a:p>
+            <a:pPr lvl="1"/>
+            <a:r>
+              <a:rPr lang="en-US" dirty="0"/>
+              <a:t>BOTH mean duration and median duration decreased</a:t>
+            </a:r>
+          </a:p>
+          <a:p>
+            <a:pPr lvl="1"/>
+            <a:r>
+              <a:rPr lang="en-US" dirty="0"/>
+              <a:t>There are songs with a variety of durations, </a:t>
+            </a:r>
+          </a:p>
+          <a:p>
+            <a:pPr marL="914400" lvl="2" indent="0">
+              <a:buNone/>
+            </a:pPr>
+            <a:r>
+              <a:rPr lang="en-US" dirty="0"/>
+              <a:t>but this does not affect the overall results</a:t>
             </a:r>
           </a:p>
         </p:txBody>
       </p:sp>
       <p:pic>
         <p:nvPicPr>
-          <p:cNvPr id="5" name="Content Placeholder 4" descr="A graph with a line&#10;&#10;Description automatically generated">
-            <a:extLst>
-              <a:ext uri="{FF2B5EF4-FFF2-40B4-BE49-F238E27FC236}">
-                <a16:creationId xmlns:a16="http://schemas.microsoft.com/office/drawing/2014/main" id="{2AE1661D-2DDA-2F14-8807-86CDD433DACD}"/>
+          <p:cNvPr id="6" name="Picture 5">
+            <a:extLst>
+              <a:ext uri="{FF2B5EF4-FFF2-40B4-BE49-F238E27FC236}">
+                <a16:creationId xmlns:a16="http://schemas.microsoft.com/office/drawing/2014/main" id="{80E3E3B5-94C8-F8A9-838E-F9F1EBC235F9}"/>
               </a:ext>
             </a:extLst>
           </p:cNvPr>
           <p:cNvPicPr>
-            <a:picLocks noGrp="1" noChangeAspect="1"/>
+            <a:picLocks noChangeAspect="1"/>
           </p:cNvPicPr>
-          <p:nvPr>
-            <p:ph idx="1"/>
-          </p:nvPr>
+          <p:nvPr/>
         </p:nvPicPr>
         <p:blipFill>
           <a:blip r:embed="rId2">
@@ -4178,41 +4507,8 @@
         </p:blipFill>
         <p:spPr>
           <a:xfrm>
-            <a:off x="6139372" y="4415630"/>
-            <a:ext cx="2075288" cy="1556466"/>
-          </a:xfrm>
-        </p:spPr>
-      </p:pic>
-      <p:pic>
-        <p:nvPicPr>
-          <p:cNvPr id="7" name="Picture 6" descr="A graph with a line&#10;&#10;Description automatically generated">
-            <a:extLst>
-              <a:ext uri="{FF2B5EF4-FFF2-40B4-BE49-F238E27FC236}">
-                <a16:creationId xmlns:a16="http://schemas.microsoft.com/office/drawing/2014/main" id="{75B649C8-586B-ED7D-2EBE-C947503958FA}"/>
-              </a:ext>
-            </a:extLst>
-          </p:cNvPr>
-          <p:cNvPicPr>
-            <a:picLocks noChangeAspect="1"/>
-          </p:cNvPicPr>
-          <p:nvPr/>
-        </p:nvPicPr>
-        <p:blipFill>
-          <a:blip r:embed="rId3">
-            <a:extLst>
-              <a:ext uri="{28A0092B-C50C-407E-A947-70E740481C1C}">
-                <a14:useLocalDpi xmlns:a14="http://schemas.microsoft.com/office/drawing/2010/main" val="0"/>
-              </a:ext>
-            </a:extLst>
-          </a:blip>
-          <a:stretch>
-            <a:fillRect/>
-          </a:stretch>
-        </p:blipFill>
-        <p:spPr>
-          <a:xfrm>
-            <a:off x="5802945" y="1664137"/>
-            <a:ext cx="2981398" cy="2236049"/>
+            <a:off x="8213852" y="239751"/>
+            <a:ext cx="3827099" cy="6378498"/>
           </a:xfrm>
           <a:prstGeom prst="rect">
             <a:avLst/>
@@ -4221,10 +4517,10 @@
       </p:pic>
       <p:pic>
         <p:nvPicPr>
-          <p:cNvPr id="9" name="Picture 8" descr="A graph with blue lines&#10;&#10;Description automatically generated">
-            <a:extLst>
-              <a:ext uri="{FF2B5EF4-FFF2-40B4-BE49-F238E27FC236}">
-                <a16:creationId xmlns:a16="http://schemas.microsoft.com/office/drawing/2014/main" id="{AD8D00BF-315B-0F60-2614-24C32AAC484A}"/>
+          <p:cNvPr id="8" name="Picture 7">
+            <a:extLst>
+              <a:ext uri="{FF2B5EF4-FFF2-40B4-BE49-F238E27FC236}">
+                <a16:creationId xmlns:a16="http://schemas.microsoft.com/office/drawing/2014/main" id="{902E4649-B4AD-2B5C-DC16-EA62B69AD0EE}"/>
               </a:ext>
             </a:extLst>
           </p:cNvPr>
@@ -4234,7 +4530,7 @@
           <p:nvPr/>
         </p:nvPicPr>
         <p:blipFill>
-          <a:blip r:embed="rId4">
+          <a:blip r:embed="rId3">
             <a:extLst>
               <a:ext uri="{28A0092B-C50C-407E-A947-70E740481C1C}">
                 <a14:useLocalDpi xmlns:a14="http://schemas.microsoft.com/office/drawing/2010/main" val="0"/>
@@ -4247,80 +4543,8 @@
         </p:blipFill>
         <p:spPr>
           <a:xfrm>
-            <a:off x="9274255" y="4857750"/>
-            <a:ext cx="2448623" cy="1836467"/>
-          </a:xfrm>
-          <a:prstGeom prst="rect">
-            <a:avLst/>
-          </a:prstGeom>
-        </p:spPr>
-      </p:pic>
-      <p:pic>
-        <p:nvPicPr>
-          <p:cNvPr id="11" name="Picture 10" descr="A graph with a line&#10;&#10;Description automatically generated">
-            <a:extLst>
-              <a:ext uri="{FF2B5EF4-FFF2-40B4-BE49-F238E27FC236}">
-                <a16:creationId xmlns:a16="http://schemas.microsoft.com/office/drawing/2014/main" id="{51094F9E-65A4-91EB-2D23-072E0924A4E8}"/>
-              </a:ext>
-            </a:extLst>
-          </p:cNvPr>
-          <p:cNvPicPr>
-            <a:picLocks noChangeAspect="1"/>
-          </p:cNvPicPr>
-          <p:nvPr/>
-        </p:nvPicPr>
-        <p:blipFill>
-          <a:blip r:embed="rId5">
-            <a:extLst>
-              <a:ext uri="{28A0092B-C50C-407E-A947-70E740481C1C}">
-                <a14:useLocalDpi xmlns:a14="http://schemas.microsoft.com/office/drawing/2010/main" val="0"/>
-              </a:ext>
-            </a:extLst>
-          </a:blip>
-          <a:stretch>
-            <a:fillRect/>
-          </a:stretch>
-        </p:blipFill>
-        <p:spPr>
-          <a:xfrm>
-            <a:off x="8727299" y="2811703"/>
-            <a:ext cx="2902623" cy="2176967"/>
-          </a:xfrm>
-          <a:prstGeom prst="rect">
-            <a:avLst/>
-          </a:prstGeom>
-        </p:spPr>
-      </p:pic>
-      <p:pic>
-        <p:nvPicPr>
-          <p:cNvPr id="13" name="Picture 12" descr="A graph with a line&#10;&#10;Description automatically generated">
-            <a:extLst>
-              <a:ext uri="{FF2B5EF4-FFF2-40B4-BE49-F238E27FC236}">
-                <a16:creationId xmlns:a16="http://schemas.microsoft.com/office/drawing/2014/main" id="{D14A4D72-34D2-B38A-377B-C602A6F3F46B}"/>
-              </a:ext>
-            </a:extLst>
-          </p:cNvPr>
-          <p:cNvPicPr>
-            <a:picLocks noChangeAspect="1"/>
-          </p:cNvPicPr>
-          <p:nvPr/>
-        </p:nvPicPr>
-        <p:blipFill>
-          <a:blip r:embed="rId6">
-            <a:extLst>
-              <a:ext uri="{28A0092B-C50C-407E-A947-70E740481C1C}">
-                <a14:useLocalDpi xmlns:a14="http://schemas.microsoft.com/office/drawing/2010/main" val="0"/>
-              </a:ext>
-            </a:extLst>
-          </a:blip>
-          <a:stretch>
-            <a:fillRect/>
-          </a:stretch>
-        </p:blipFill>
-        <p:spPr>
-          <a:xfrm>
-            <a:off x="8877299" y="552053"/>
-            <a:ext cx="3012867" cy="2259650"/>
+            <a:off x="4235705" y="1690688"/>
+            <a:ext cx="3978147" cy="2983610"/>
           </a:xfrm>
           <a:prstGeom prst="rect">
             <a:avLst/>
@@ -4330,7 +4554,7 @@
     </p:spTree>
     <p:extLst>
       <p:ext uri="{BB962C8B-B14F-4D97-AF65-F5344CB8AC3E}">
-        <p14:creationId xmlns:p14="http://schemas.microsoft.com/office/powerpoint/2010/main" val="3951536143"/>
+        <p14:creationId xmlns:p14="http://schemas.microsoft.com/office/powerpoint/2010/main" val="1985642781"/>
       </p:ext>
     </p:extLst>
   </p:cSld>
@@ -4362,7 +4586,7 @@
           <p:cNvPr id="2" name="Title 1">
             <a:extLst>
               <a:ext uri="{FF2B5EF4-FFF2-40B4-BE49-F238E27FC236}">
-                <a16:creationId xmlns:a16="http://schemas.microsoft.com/office/drawing/2014/main" id="{59017C7C-5DC7-A674-8610-2A2C05E4E66D}"/>
+                <a16:creationId xmlns:a16="http://schemas.microsoft.com/office/drawing/2014/main" id="{B25143C0-5AA1-7225-FDA7-2F529D876485}"/>
               </a:ext>
             </a:extLst>
           </p:cNvPr>
@@ -4379,9 +4603,10 @@
           <a:lstStyle/>
           <a:p>
             <a:r>
-              <a:rPr lang="en-GB" dirty="0"/>
-              <a:t>Artists</a:t>
-            </a:r>
+              <a:rPr lang="en-GB" b="1" dirty="0"/>
+              <a:t>Song Duration Has Decreased</a:t>
+            </a:r>
+            <a:endParaRPr lang="en-US" b="1" dirty="0"/>
           </a:p>
         </p:txBody>
       </p:sp>
@@ -4390,7 +4615,7 @@
           <p:cNvPr id="3" name="Content Placeholder 2">
             <a:extLst>
               <a:ext uri="{FF2B5EF4-FFF2-40B4-BE49-F238E27FC236}">
-                <a16:creationId xmlns:a16="http://schemas.microsoft.com/office/drawing/2014/main" id="{F6EDA27F-C57D-C2FD-49DE-D73B22738517}"/>
+                <a16:creationId xmlns:a16="http://schemas.microsoft.com/office/drawing/2014/main" id="{B4853673-314B-EEF2-DCA3-FC42351CEB3D}"/>
               </a:ext>
             </a:extLst>
           </p:cNvPr>
@@ -4406,14 +4631,77 @@
           <a:bodyPr/>
           <a:lstStyle/>
           <a:p>
-            <a:endParaRPr lang="en-GB"/>
-          </a:p>
-        </p:txBody>
-      </p:sp>
+            <a:r>
+              <a:rPr lang="en-US" dirty="0"/>
+              <a:t>How?</a:t>
+            </a:r>
+          </a:p>
+          <a:p>
+            <a:pPr lvl="1"/>
+            <a:r>
+              <a:rPr lang="en-US" dirty="0"/>
+              <a:t>Histogram</a:t>
+            </a:r>
+          </a:p>
+          <a:p>
+            <a:pPr lvl="2"/>
+            <a:r>
+              <a:rPr lang="en-US" dirty="0"/>
+              <a:t>Shifted left over the years</a:t>
+            </a:r>
+          </a:p>
+          <a:p>
+            <a:pPr lvl="2"/>
+            <a:r>
+              <a:rPr lang="en-US" dirty="0"/>
+              <a:t>More shorter songs in 2022 than in 2017</a:t>
+            </a:r>
+          </a:p>
+          <a:p>
+            <a:endParaRPr lang="en-US" dirty="0"/>
+          </a:p>
+        </p:txBody>
+      </p:sp>
+      <p:pic>
+        <p:nvPicPr>
+          <p:cNvPr id="5" name="Picture 4">
+            <a:extLst>
+              <a:ext uri="{FF2B5EF4-FFF2-40B4-BE49-F238E27FC236}">
+                <a16:creationId xmlns:a16="http://schemas.microsoft.com/office/drawing/2014/main" id="{1C15677A-6990-8C11-E473-0E46FE886114}"/>
+              </a:ext>
+            </a:extLst>
+          </p:cNvPr>
+          <p:cNvPicPr>
+            <a:picLocks noChangeAspect="1"/>
+          </p:cNvPicPr>
+          <p:nvPr/>
+        </p:nvPicPr>
+        <p:blipFill>
+          <a:blip r:embed="rId2">
+            <a:extLst>
+              <a:ext uri="{28A0092B-C50C-407E-A947-70E740481C1C}">
+                <a14:useLocalDpi xmlns:a14="http://schemas.microsoft.com/office/drawing/2010/main" val="0"/>
+              </a:ext>
+            </a:extLst>
+          </a:blip>
+          <a:stretch>
+            <a:fillRect/>
+          </a:stretch>
+        </p:blipFill>
+        <p:spPr>
+          <a:xfrm>
+            <a:off x="6267233" y="2776654"/>
+            <a:ext cx="5816971" cy="3635607"/>
+          </a:xfrm>
+          <a:prstGeom prst="rect">
+            <a:avLst/>
+          </a:prstGeom>
+        </p:spPr>
+      </p:pic>
     </p:spTree>
     <p:extLst>
       <p:ext uri="{BB962C8B-B14F-4D97-AF65-F5344CB8AC3E}">
-        <p14:creationId xmlns:p14="http://schemas.microsoft.com/office/powerpoint/2010/main" val="277639627"/>
+        <p14:creationId xmlns:p14="http://schemas.microsoft.com/office/powerpoint/2010/main" val="1283658392"/>
       </p:ext>
     </p:extLst>
   </p:cSld>
@@ -4445,7 +4733,7 @@
           <p:cNvPr id="2" name="Title 1">
             <a:extLst>
               <a:ext uri="{FF2B5EF4-FFF2-40B4-BE49-F238E27FC236}">
-                <a16:creationId xmlns:a16="http://schemas.microsoft.com/office/drawing/2014/main" id="{B4FB5A95-3AF6-65D8-08CD-8D585C5E2DB8}"/>
+                <a16:creationId xmlns:a16="http://schemas.microsoft.com/office/drawing/2014/main" id="{042D601F-561E-28E4-0CC4-BD7FAAADE5D3}"/>
               </a:ext>
             </a:extLst>
           </p:cNvPr>
@@ -4462,8 +4750,8 @@
           <a:lstStyle/>
           <a:p>
             <a:r>
-              <a:rPr lang="en-GB" dirty="0"/>
-              <a:t>Conclusions</a:t>
+              <a:rPr lang="en-US" b="1" dirty="0"/>
+              <a:t>A few more questions to ask</a:t>
             </a:r>
           </a:p>
         </p:txBody>
@@ -4473,7 +4761,7 @@
           <p:cNvPr id="3" name="Content Placeholder 2">
             <a:extLst>
               <a:ext uri="{FF2B5EF4-FFF2-40B4-BE49-F238E27FC236}">
-                <a16:creationId xmlns:a16="http://schemas.microsoft.com/office/drawing/2014/main" id="{D6A2EAFD-CEA7-3D77-824C-7210674B2B0A}"/>
+                <a16:creationId xmlns:a16="http://schemas.microsoft.com/office/drawing/2014/main" id="{66764F28-952D-A5CB-AE89-0C0D15A55AFD}"/>
               </a:ext>
             </a:extLst>
           </p:cNvPr>
@@ -4486,17 +4774,262 @@
         </p:nvSpPr>
         <p:spPr/>
         <p:txBody>
-          <a:bodyPr/>
-          <a:lstStyle/>
-          <a:p>
-            <a:endParaRPr lang="en-GB"/>
-          </a:p>
-        </p:txBody>
-      </p:sp>
+          <a:bodyPr>
+            <a:normAutofit/>
+          </a:bodyPr>
+          <a:lstStyle/>
+          <a:p>
+            <a:r>
+              <a:rPr lang="en-US" dirty="0"/>
+              <a:t>Are shorter songs more popular?</a:t>
+            </a:r>
+          </a:p>
+          <a:p>
+            <a:pPr lvl="1"/>
+            <a:r>
+              <a:rPr lang="en-US" dirty="0"/>
+              <a:t>Scatter plot - Duration Vs. Popularity</a:t>
+            </a:r>
+          </a:p>
+          <a:p>
+            <a:pPr lvl="1"/>
+            <a:r>
+              <a:rPr lang="en-US" dirty="0"/>
+              <a:t>-0.06 &lt; </a:t>
+            </a:r>
+            <a:r>
+              <a:rPr lang="en-US" dirty="0" err="1"/>
+              <a:t>r-value</a:t>
+            </a:r>
+            <a:r>
+              <a:rPr lang="en-US" dirty="0"/>
+              <a:t> &lt; 0.15</a:t>
+            </a:r>
+          </a:p>
+          <a:p>
+            <a:endParaRPr lang="en-US" dirty="0"/>
+          </a:p>
+          <a:p>
+            <a:pPr marL="457200" lvl="1" indent="0">
+              <a:buNone/>
+            </a:pPr>
+            <a:endParaRPr lang="en-US" dirty="0"/>
+          </a:p>
+          <a:p>
+            <a:endParaRPr lang="en-US" dirty="0"/>
+          </a:p>
+        </p:txBody>
+      </p:sp>
+      <p:pic>
+        <p:nvPicPr>
+          <p:cNvPr id="7" name="Picture 6">
+            <a:extLst>
+              <a:ext uri="{FF2B5EF4-FFF2-40B4-BE49-F238E27FC236}">
+                <a16:creationId xmlns:a16="http://schemas.microsoft.com/office/drawing/2014/main" id="{2FCF4EF6-EDBE-E67B-B77C-8AF884FB91D1}"/>
+              </a:ext>
+            </a:extLst>
+          </p:cNvPr>
+          <p:cNvPicPr>
+            <a:picLocks noChangeAspect="1"/>
+          </p:cNvPicPr>
+          <p:nvPr/>
+        </p:nvPicPr>
+        <p:blipFill>
+          <a:blip r:embed="rId2">
+            <a:extLst>
+              <a:ext uri="{28A0092B-C50C-407E-A947-70E740481C1C}">
+                <a14:useLocalDpi xmlns:a14="http://schemas.microsoft.com/office/drawing/2010/main" val="0"/>
+              </a:ext>
+            </a:extLst>
+          </a:blip>
+          <a:stretch>
+            <a:fillRect/>
+          </a:stretch>
+        </p:blipFill>
+        <p:spPr>
+          <a:xfrm>
+            <a:off x="5754029" y="2714353"/>
+            <a:ext cx="6045634" cy="3778522"/>
+          </a:xfrm>
+          <a:prstGeom prst="rect">
+            <a:avLst/>
+          </a:prstGeom>
+        </p:spPr>
+      </p:pic>
     </p:spTree>
     <p:extLst>
       <p:ext uri="{BB962C8B-B14F-4D97-AF65-F5344CB8AC3E}">
-        <p14:creationId xmlns:p14="http://schemas.microsoft.com/office/powerpoint/2010/main" val="3616880911"/>
+        <p14:creationId xmlns:p14="http://schemas.microsoft.com/office/powerpoint/2010/main" val="2275843868"/>
+      </p:ext>
+    </p:extLst>
+  </p:cSld>
+  <p:clrMapOvr>
+    <a:masterClrMapping/>
+  </p:clrMapOvr>
+</p:sld>
+</file>
+
+<file path=ppt/slides/slide9.xml><?xml version="1.0" encoding="utf-8"?>
+<p:sld xmlns:a="http://schemas.openxmlformats.org/drawingml/2006/main" xmlns:r="http://schemas.openxmlformats.org/officeDocument/2006/relationships" xmlns:p="http://schemas.openxmlformats.org/presentationml/2006/main">
+  <p:cSld>
+    <p:spTree>
+      <p:nvGrpSpPr>
+        <p:cNvPr id="1" name=""/>
+        <p:cNvGrpSpPr/>
+        <p:nvPr/>
+      </p:nvGrpSpPr>
+      <p:grpSpPr>
+        <a:xfrm>
+          <a:off x="0" y="0"/>
+          <a:ext cx="0" cy="0"/>
+          <a:chOff x="0" y="0"/>
+          <a:chExt cx="0" cy="0"/>
+        </a:xfrm>
+      </p:grpSpPr>
+      <p:sp>
+        <p:nvSpPr>
+          <p:cNvPr id="2" name="Title 1">
+            <a:extLst>
+              <a:ext uri="{FF2B5EF4-FFF2-40B4-BE49-F238E27FC236}">
+                <a16:creationId xmlns:a16="http://schemas.microsoft.com/office/drawing/2014/main" id="{E75A9F35-6F11-7C3A-3EF6-28938AF72CFF}"/>
+              </a:ext>
+            </a:extLst>
+          </p:cNvPr>
+          <p:cNvSpPr>
+            <a:spLocks noGrp="1"/>
+          </p:cNvSpPr>
+          <p:nvPr>
+            <p:ph type="title"/>
+          </p:nvPr>
+        </p:nvSpPr>
+        <p:spPr/>
+        <p:txBody>
+          <a:bodyPr/>
+          <a:lstStyle/>
+          <a:p>
+            <a:r>
+              <a:rPr lang="en-US" b="1" dirty="0"/>
+              <a:t>A few more questions to ask</a:t>
+            </a:r>
+          </a:p>
+        </p:txBody>
+      </p:sp>
+      <p:sp>
+        <p:nvSpPr>
+          <p:cNvPr id="3" name="Content Placeholder 2">
+            <a:extLst>
+              <a:ext uri="{FF2B5EF4-FFF2-40B4-BE49-F238E27FC236}">
+                <a16:creationId xmlns:a16="http://schemas.microsoft.com/office/drawing/2014/main" id="{0F934240-3E52-7165-EB42-D90BFE902635}"/>
+              </a:ext>
+            </a:extLst>
+          </p:cNvPr>
+          <p:cNvSpPr>
+            <a:spLocks noGrp="1"/>
+          </p:cNvSpPr>
+          <p:nvPr>
+            <p:ph idx="1"/>
+          </p:nvPr>
+        </p:nvSpPr>
+        <p:spPr/>
+        <p:txBody>
+          <a:bodyPr>
+            <a:normAutofit fontScale="92500" lnSpcReduction="20000"/>
+          </a:bodyPr>
+          <a:lstStyle/>
+          <a:p>
+            <a:r>
+              <a:rPr lang="en-GB" dirty="0"/>
+              <a:t>Did the rise of TikTok or other short video social media websites contribute to the change in music duration?</a:t>
+            </a:r>
+          </a:p>
+          <a:p>
+            <a:pPr lvl="1"/>
+            <a:r>
+              <a:rPr lang="en-GB" dirty="0"/>
+              <a:t>Duration Vs. TikTok users</a:t>
+            </a:r>
+          </a:p>
+          <a:p>
+            <a:pPr lvl="1"/>
+            <a:r>
+              <a:rPr lang="en-GB" dirty="0" err="1"/>
+              <a:t>r-value</a:t>
+            </a:r>
+            <a:r>
+              <a:rPr lang="en-GB" dirty="0"/>
+              <a:t> ~ - 0.7</a:t>
+            </a:r>
+          </a:p>
+          <a:p>
+            <a:endParaRPr lang="en-GB" dirty="0"/>
+          </a:p>
+          <a:p>
+            <a:endParaRPr lang="en-GB" dirty="0"/>
+          </a:p>
+          <a:p>
+            <a:endParaRPr lang="en-GB" dirty="0"/>
+          </a:p>
+          <a:p>
+            <a:endParaRPr lang="en-GB" dirty="0"/>
+          </a:p>
+          <a:p>
+            <a:endParaRPr lang="en-GB" dirty="0"/>
+          </a:p>
+          <a:p>
+            <a:r>
+              <a:rPr lang="en-GB" dirty="0"/>
+              <a:t>Was the COVID-19 pandemic a major factor underlying this trend?</a:t>
+            </a:r>
+          </a:p>
+          <a:p>
+            <a:pPr lvl="1"/>
+            <a:r>
+              <a:rPr lang="en-GB" dirty="0"/>
+              <a:t>No conclusions can be drawn based on the analysed data</a:t>
+            </a:r>
+          </a:p>
+        </p:txBody>
+      </p:sp>
+      <p:pic>
+        <p:nvPicPr>
+          <p:cNvPr id="7" name="Picture 6">
+            <a:extLst>
+              <a:ext uri="{FF2B5EF4-FFF2-40B4-BE49-F238E27FC236}">
+                <a16:creationId xmlns:a16="http://schemas.microsoft.com/office/drawing/2014/main" id="{C161D9FE-3D8C-F26B-A286-3DDA06C6E48F}"/>
+              </a:ext>
+            </a:extLst>
+          </p:cNvPr>
+          <p:cNvPicPr>
+            <a:picLocks noChangeAspect="1"/>
+          </p:cNvPicPr>
+          <p:nvPr/>
+        </p:nvPicPr>
+        <p:blipFill>
+          <a:blip r:embed="rId2">
+            <a:extLst>
+              <a:ext uri="{28A0092B-C50C-407E-A947-70E740481C1C}">
+                <a14:useLocalDpi xmlns:a14="http://schemas.microsoft.com/office/drawing/2010/main" val="0"/>
+              </a:ext>
+            </a:extLst>
+          </a:blip>
+          <a:stretch>
+            <a:fillRect/>
+          </a:stretch>
+        </p:blipFill>
+        <p:spPr>
+          <a:xfrm>
+            <a:off x="7828156" y="2364058"/>
+            <a:ext cx="3697868" cy="2773401"/>
+          </a:xfrm>
+          <a:prstGeom prst="rect">
+            <a:avLst/>
+          </a:prstGeom>
+        </p:spPr>
+      </p:pic>
+    </p:spTree>
+    <p:extLst>
+      <p:ext uri="{BB962C8B-B14F-4D97-AF65-F5344CB8AC3E}">
+        <p14:creationId xmlns:p14="http://schemas.microsoft.com/office/powerpoint/2010/main" val="3779487013"/>
       </p:ext>
     </p:extLst>
   </p:cSld>

</xml_diff>